<commit_message>
Added linear gradient and rectangle gradient
</commit_message>
<xml_diff>
--- a/test/ShapeCrawler.Tests.Unit.xUnit/Resource/autoshape/autoshape-case018_rotation.pptx
+++ b/test/ShapeCrawler.Tests.Unit.xUnit/Resource/autoshape/autoshape-case018_rotation.pptx
@@ -7,7 +7,6 @@
   <p:sldIdLst>
     <p:sldId id="261" r:id="rId2"/>
     <p:sldId id="262" r:id="rId3"/>
-    <p:sldId id="263" r:id="rId4"/>
   </p:sldIdLst>
   <p:sldSz cx="9144000" cy="5143500" type="screen16x9"/>
   <p:notesSz cx="7772400" cy="10058400"/>
@@ -2557,89 +2556,6 @@
 </p:sld>
 </file>
 
-<file path=ppt/slides/slide3.xml><?xml version="1.0" encoding="utf-8"?>
-<p:sld xmlns:a="http://schemas.openxmlformats.org/drawingml/2006/main" xmlns:r="http://schemas.openxmlformats.org/officeDocument/2006/relationships" xmlns:p="http://schemas.openxmlformats.org/presentationml/2006/main">
-  <p:cSld>
-    <p:spTree>
-      <p:nvGrpSpPr>
-        <p:cNvPr id="1" name=""/>
-        <p:cNvGrpSpPr/>
-        <p:nvPr/>
-      </p:nvGrpSpPr>
-      <p:grpSpPr>
-        <a:xfrm>
-          <a:off x="0" y="0"/>
-          <a:ext cx="0" cy="0"/>
-          <a:chOff x="0" y="0"/>
-          <a:chExt cx="0" cy="0"/>
-        </a:xfrm>
-      </p:grpSpPr>
-      <p:sp>
-        <p:nvSpPr>
-          <p:cNvPr id="2" name="Title 1">
-            <a:extLst>
-              <a:ext uri="{FF2B5EF4-FFF2-40B4-BE49-F238E27FC236}">
-                <a16:creationId xmlns:a16="http://schemas.microsoft.com/office/drawing/2014/main" id="{53B667A6-C46E-9C74-FC1C-4A0A1524C9DF}"/>
-              </a:ext>
-            </a:extLst>
-          </p:cNvPr>
-          <p:cNvSpPr>
-            <a:spLocks noGrp="1"/>
-          </p:cNvSpPr>
-          <p:nvPr>
-            <p:ph type="title"/>
-          </p:nvPr>
-        </p:nvSpPr>
-        <p:spPr/>
-        <p:txBody>
-          <a:bodyPr/>
-          <a:lstStyle/>
-          <a:p>
-            <a:endParaRPr lang="en-UY"/>
-          </a:p>
-        </p:txBody>
-      </p:sp>
-      <p:sp>
-        <p:nvSpPr>
-          <p:cNvPr id="3" name="Content Placeholder 2">
-            <a:extLst>
-              <a:ext uri="{FF2B5EF4-FFF2-40B4-BE49-F238E27FC236}">
-                <a16:creationId xmlns:a16="http://schemas.microsoft.com/office/drawing/2014/main" id="{2D5378D6-E60E-5ECE-0DD4-BC28137F8B0F}"/>
-              </a:ext>
-            </a:extLst>
-          </p:cNvPr>
-          <p:cNvSpPr>
-            <a:spLocks noGrp="1"/>
-          </p:cNvSpPr>
-          <p:nvPr>
-            <p:ph sz="quarter" idx="10"/>
-          </p:nvPr>
-        </p:nvSpPr>
-        <p:spPr/>
-        <p:txBody>
-          <a:bodyPr/>
-          <a:lstStyle/>
-          <a:p>
-            <a:r>
-              <a:rPr lang="en-UY" dirty="0"/>
-              <a:t>hfahdgfkjahsdhflswd</a:t>
-            </a:r>
-          </a:p>
-        </p:txBody>
-      </p:sp>
-    </p:spTree>
-    <p:extLst>
-      <p:ext uri="{BB962C8B-B14F-4D97-AF65-F5344CB8AC3E}">
-        <p14:creationId xmlns:p14="http://schemas.microsoft.com/office/powerpoint/2010/main" val="565855551"/>
-      </p:ext>
-    </p:extLst>
-  </p:cSld>
-  <p:clrMapOvr>
-    <a:masterClrMapping/>
-  </p:clrMapOvr>
-</p:sld>
-</file>
-
 <file path=ppt/theme/theme1.xml><?xml version="1.0" encoding="utf-8"?>
 <a:theme xmlns:a="http://schemas.openxmlformats.org/drawingml/2006/main" name="Office Theme">
   <a:themeElements>

</xml_diff>